<commit_message>
methods table, intro finish, its v2
</commit_message>
<xml_diff>
--- a/lectures/01_introduction/intro_2.pptx
+++ b/lectures/01_introduction/intro_2.pptx
@@ -303,7 +303,7 @@
             <a:fld id="{61C17900-95FA-4124-853C-9BC71B59CBE5}" type="datetime1">
               <a:rPr lang="en-GB"/>
               <a:pPr lvl="0"/>
-              <a:t>27/01/2023</a:t>
+              <a:t>09/05/2023</a:t>
             </a:fld>
             <a:endParaRPr lang="en-GB"/>
           </a:p>
@@ -1191,7 +1191,16 @@
           <a:bodyPr/>
           <a:lstStyle/>
           <a:p>
-            <a:endParaRPr lang="en-NL" dirty="0"/>
+            <a:r>
+              <a:rPr lang="en-GB" dirty="0"/>
+              <a:t>OR: Here the variance is coming from the fact that you don’t feed the means in, but instead the raw data, which are now treated as observations from two groups</a:t>
+            </a:r>
+          </a:p>
+          <a:p>
+            <a:r>
+              <a:rPr lang="en-GB" dirty="0"/>
+              <a:t>Maybe here we could include the “data” type slide, or do you do that in the practical? See my part 1 slides</a:t>
+            </a:r>
           </a:p>
         </p:txBody>
       </p:sp>
@@ -2811,6 +2820,10 @@
           <a:bodyPr/>
           <a:lstStyle/>
           <a:p>
+            <a:r>
+              <a:rPr lang="en-GB" dirty="0"/>
+              <a:t>OR: No interference; the fact that California has a smoking ban has no effect on cigarette sales in Utah (cig sales Utah is the same as it would be if California had no cigarette ban). Can we think of any problems with this? For example, Utah might also follow suit to the nearby state and not allow smoking… people living in Utah might work in California, etc… bias in either direction possible</a:t>
+            </a:r>
             <a:endParaRPr lang="en-NL" dirty="0"/>
           </a:p>
         </p:txBody>
@@ -3441,6 +3454,16 @@
           <a:bodyPr/>
           <a:lstStyle/>
           <a:p>
+            <a:r>
+              <a:rPr lang="en-GB" dirty="0"/>
+              <a:t>OR note: Should we define this in words? Change in the average number of cigarette sales in the years that follow the intervention, relative to what we would have expected average cigarette sales to be in the absence of an intervention</a:t>
+            </a:r>
+          </a:p>
+          <a:p>
+            <a:r>
+              <a:rPr lang="en-GB" dirty="0"/>
+              <a:t>Also, note here, no “bar” over the latter quantity, maybe just also remove it from the first?; we also use different notation (Expected  values, post and pre vs t, s)</a:t>
+            </a:r>
             <a:endParaRPr lang="en-NL" dirty="0"/>
           </a:p>
         </p:txBody>
@@ -3607,7 +3630,7 @@
             <a:fld id="{4A25D1A3-0A93-4C94-80FF-26B8FD61124B}" type="datetime1">
               <a:rPr lang="en-GB"/>
               <a:pPr lvl="0"/>
-              <a:t>27/01/2023</a:t>
+              <a:t>09/05/2023</a:t>
             </a:fld>
             <a:endParaRPr lang="en-GB"/>
           </a:p>
@@ -3844,7 +3867,7 @@
             <a:fld id="{81142B93-5A2B-450B-8B37-47C337A7F461}" type="datetime1">
               <a:rPr lang="en-GB"/>
               <a:pPr lvl="0"/>
-              <a:t>27/01/2023</a:t>
+              <a:t>09/05/2023</a:t>
             </a:fld>
             <a:endParaRPr lang="en-GB"/>
           </a:p>
@@ -4090,7 +4113,7 @@
             <a:fld id="{6E063067-B603-41EE-A9A7-41899DD775E6}" type="datetime1">
               <a:rPr lang="en-GB"/>
               <a:pPr lvl="0"/>
-              <a:t>27/01/2023</a:t>
+              <a:t>09/05/2023</a:t>
             </a:fld>
             <a:endParaRPr lang="en-GB"/>
           </a:p>
@@ -4326,7 +4349,7 @@
             <a:fld id="{6F249873-F8C6-4397-84F9-F8EC0F22A697}" type="datetime1">
               <a:rPr lang="en-GB"/>
               <a:pPr lvl="0"/>
-              <a:t>27/01/2023</a:t>
+              <a:t>09/05/2023</a:t>
             </a:fld>
             <a:endParaRPr lang="en-GB"/>
           </a:p>
@@ -4537,7 +4560,7 @@
             <a:fld id="{C12BD4ED-6206-4BF6-96F8-E25353DC0FB4}" type="datetime1">
               <a:rPr lang="en-GB"/>
               <a:pPr lvl="0"/>
-              <a:t>27/01/2023</a:t>
+              <a:t>09/05/2023</a:t>
             </a:fld>
             <a:endParaRPr lang="en-GB"/>
           </a:p>
@@ -4857,7 +4880,7 @@
             <a:fld id="{39B86B4E-481C-4780-B006-4B46E923812F}" type="datetime1">
               <a:rPr lang="en-GB"/>
               <a:pPr lvl="0"/>
-              <a:t>27/01/2023</a:t>
+              <a:t>09/05/2023</a:t>
             </a:fld>
             <a:endParaRPr lang="en-GB"/>
           </a:p>
@@ -5260,7 +5283,7 @@
             <a:fld id="{4D4B0C8B-6A6B-4F9A-AD92-C7A874294C43}" type="datetime1">
               <a:rPr lang="en-GB"/>
               <a:pPr lvl="0"/>
-              <a:t>27/01/2023</a:t>
+              <a:t>09/05/2023</a:t>
             </a:fld>
             <a:endParaRPr lang="en-GB"/>
           </a:p>
@@ -5422,7 +5445,7 @@
             <a:fld id="{2242089C-BC90-4A09-BBF2-11ACCFCC6AAC}" type="datetime1">
               <a:rPr lang="en-GB"/>
               <a:pPr lvl="0"/>
-              <a:t>27/01/2023</a:t>
+              <a:t>09/05/2023</a:t>
             </a:fld>
             <a:endParaRPr lang="en-GB"/>
           </a:p>
@@ -5550,7 +5573,7 @@
             <a:fld id="{9E45A0C3-C9A4-409A-ABC1-542A7544900D}" type="datetime1">
               <a:rPr lang="en-GB"/>
               <a:pPr lvl="0"/>
-              <a:t>27/01/2023</a:t>
+              <a:t>09/05/2023</a:t>
             </a:fld>
             <a:endParaRPr lang="en-GB"/>
           </a:p>
@@ -5835,7 +5858,7 @@
             <a:fld id="{FE905373-3B96-430D-80BE-EEB6F3514509}" type="datetime1">
               <a:rPr lang="en-GB"/>
               <a:pPr lvl="0"/>
-              <a:t>27/01/2023</a:t>
+              <a:t>09/05/2023</a:t>
             </a:fld>
             <a:endParaRPr lang="en-GB"/>
           </a:p>
@@ -6077,7 +6100,7 @@
             <a:fld id="{FD713A6C-3BFD-4C18-89E6-78D595B19DB8}" type="datetime1">
               <a:rPr lang="en-GB"/>
               <a:pPr lvl="0"/>
-              <a:t>27/01/2023</a:t>
+              <a:t>09/05/2023</a:t>
             </a:fld>
             <a:endParaRPr lang="en-GB"/>
           </a:p>
@@ -6360,7 +6383,7 @@
             <a:fld id="{19E4415A-9E33-406F-911E-8770DEE3AE96}" type="datetime1">
               <a:rPr lang="en-GB"/>
               <a:pPr lvl="0"/>
-              <a:t>27/01/2023</a:t>
+              <a:t>09/05/2023</a:t>
             </a:fld>
             <a:endParaRPr lang="en-GB"/>
           </a:p>
@@ -7424,8 +7447,8 @@
           </a:p>
         </p:txBody>
       </p:sp>
-      <mc:AlternateContent xmlns:mc="http://schemas.openxmlformats.org/markup-compatibility/2006">
-        <mc:Choice xmlns:a14="http://schemas.microsoft.com/office/drawing/2010/main" Requires="a14">
+      <mc:AlternateContent xmlns:mc="http://schemas.openxmlformats.org/markup-compatibility/2006" xmlns:a14="http://schemas.microsoft.com/office/drawing/2010/main">
+        <mc:Choice Requires="a14">
           <p:sp>
             <p:nvSpPr>
               <p:cNvPr id="3" name="Content Placeholder 2">
@@ -8288,7 +8311,7 @@
             </p:txBody>
           </p:sp>
         </mc:Choice>
-        <mc:Fallback>
+        <mc:Fallback xmlns="">
           <p:sp>
             <p:nvSpPr>
               <p:cNvPr id="3" name="Content Placeholder 2">
@@ -8402,8 +8425,8 @@
           </a:p>
         </p:txBody>
       </p:sp>
-      <mc:AlternateContent xmlns:mc="http://schemas.openxmlformats.org/markup-compatibility/2006">
-        <mc:Choice xmlns:a14="http://schemas.microsoft.com/office/drawing/2010/main" Requires="a14">
+      <mc:AlternateContent xmlns:mc="http://schemas.openxmlformats.org/markup-compatibility/2006" xmlns:a14="http://schemas.microsoft.com/office/drawing/2010/main">
+        <mc:Choice Requires="a14">
           <p:sp>
             <p:nvSpPr>
               <p:cNvPr id="3" name="Content Placeholder 2">
@@ -8827,7 +8850,7 @@
             </p:txBody>
           </p:sp>
         </mc:Choice>
-        <mc:Fallback>
+        <mc:Fallback xmlns="">
           <p:sp>
             <p:nvSpPr>
               <p:cNvPr id="3" name="Content Placeholder 2">
@@ -9224,8 +9247,8 @@
           <a:chExt cx="0" cy="0"/>
         </a:xfrm>
       </p:grpSpPr>
-      <mc:AlternateContent xmlns:mc="http://schemas.openxmlformats.org/markup-compatibility/2006">
-        <mc:Choice xmlns:a14="http://schemas.microsoft.com/office/drawing/2010/main" Requires="a14">
+      <mc:AlternateContent xmlns:mc="http://schemas.openxmlformats.org/markup-compatibility/2006" xmlns:a14="http://schemas.microsoft.com/office/drawing/2010/main">
+        <mc:Choice Requires="a14">
           <p:sp>
             <p:nvSpPr>
               <p:cNvPr id="3" name="Content Placeholder 2">
@@ -9360,7 +9383,7 @@
             </p:txBody>
           </p:sp>
         </mc:Choice>
-        <mc:Fallback>
+        <mc:Fallback xmlns="">
           <p:sp>
             <p:nvSpPr>
               <p:cNvPr id="3" name="Content Placeholder 2">
@@ -9821,8 +9844,8 @@
           </a:p>
         </p:txBody>
       </p:sp>
-      <mc:AlternateContent xmlns:mc="http://schemas.openxmlformats.org/markup-compatibility/2006">
-        <mc:Choice xmlns:a14="http://schemas.microsoft.com/office/drawing/2010/main" Requires="a14">
+      <mc:AlternateContent xmlns:mc="http://schemas.openxmlformats.org/markup-compatibility/2006" xmlns:a14="http://schemas.microsoft.com/office/drawing/2010/main">
+        <mc:Choice Requires="a14">
           <p:sp>
             <p:nvSpPr>
               <p:cNvPr id="3" name="Content Placeholder 2">
@@ -10035,7 +10058,7 @@
             </p:txBody>
           </p:sp>
         </mc:Choice>
-        <mc:Fallback>
+        <mc:Fallback xmlns="">
           <p:sp>
             <p:nvSpPr>
               <p:cNvPr id="3" name="Content Placeholder 2">
@@ -10309,8 +10332,8 @@
           </a:p>
         </p:txBody>
       </p:sp>
-      <mc:AlternateContent xmlns:mc="http://schemas.openxmlformats.org/markup-compatibility/2006">
-        <mc:Choice xmlns:a14="http://schemas.microsoft.com/office/drawing/2010/main" Requires="a14">
+      <mc:AlternateContent xmlns:mc="http://schemas.openxmlformats.org/markup-compatibility/2006" xmlns:a14="http://schemas.microsoft.com/office/drawing/2010/main">
+        <mc:Choice Requires="a14">
           <p:sp>
             <p:nvSpPr>
               <p:cNvPr id="3" name="Content Placeholder 2">
@@ -10642,7 +10665,7 @@
             </p:txBody>
           </p:sp>
         </mc:Choice>
-        <mc:Fallback>
+        <mc:Fallback xmlns="">
           <p:sp>
             <p:nvSpPr>
               <p:cNvPr id="3" name="Content Placeholder 2">
@@ -11300,8 +11323,8 @@
           </a:p>
         </p:txBody>
       </p:sp>
-      <mc:AlternateContent xmlns:mc="http://schemas.openxmlformats.org/markup-compatibility/2006">
-        <mc:Choice xmlns:a14="http://schemas.microsoft.com/office/drawing/2010/main" Requires="a14">
+      <mc:AlternateContent xmlns:mc="http://schemas.openxmlformats.org/markup-compatibility/2006" xmlns:a14="http://schemas.microsoft.com/office/drawing/2010/main">
+        <mc:Choice Requires="a14">
           <p:sp>
             <p:nvSpPr>
               <p:cNvPr id="3" name="Content Placeholder 2">
@@ -11491,7 +11514,7 @@
             </p:txBody>
           </p:sp>
         </mc:Choice>
-        <mc:Fallback>
+        <mc:Fallback xmlns="">
           <p:sp>
             <p:nvSpPr>
               <p:cNvPr id="3" name="Content Placeholder 2">
@@ -11739,8 +11762,8 @@
           </a:p>
         </p:txBody>
       </p:sp>
-      <mc:AlternateContent xmlns:mc="http://schemas.openxmlformats.org/markup-compatibility/2006">
-        <mc:Choice xmlns:a14="http://schemas.microsoft.com/office/drawing/2010/main" Requires="a14">
+      <mc:AlternateContent xmlns:mc="http://schemas.openxmlformats.org/markup-compatibility/2006" xmlns:a14="http://schemas.microsoft.com/office/drawing/2010/main">
+        <mc:Choice Requires="a14">
           <p:sp>
             <p:nvSpPr>
               <p:cNvPr id="3" name="Content Placeholder 2">
@@ -12499,7 +12522,7 @@
             </p:txBody>
           </p:sp>
         </mc:Choice>
-        <mc:Fallback>
+        <mc:Fallback xmlns="">
           <p:sp>
             <p:nvSpPr>
               <p:cNvPr id="3" name="Content Placeholder 2">
@@ -12613,8 +12636,8 @@
           </a:p>
         </p:txBody>
       </p:sp>
-      <mc:AlternateContent xmlns:mc="http://schemas.openxmlformats.org/markup-compatibility/2006">
-        <mc:Choice xmlns:a14="http://schemas.microsoft.com/office/drawing/2010/main" Requires="a14">
+      <mc:AlternateContent xmlns:mc="http://schemas.openxmlformats.org/markup-compatibility/2006" xmlns:a14="http://schemas.microsoft.com/office/drawing/2010/main">
+        <mc:Choice Requires="a14">
           <p:sp>
             <p:nvSpPr>
               <p:cNvPr id="3" name="Content Placeholder 2">
@@ -13349,19 +13372,7 @@
                               </a:solidFill>
                               <a:latin typeface="Cambria Math" panose="02040503050406030204" pitchFamily="18" charset="0"/>
                             </a:rPr>
-                            <m:t>𝑝</m:t>
-                          </m:r>
-                          <m:r>
-                            <a:rPr lang="en-US" sz="3200" i="1">
-                              <a:solidFill>
-                                <a:schemeClr val="tx1">
-                                  <a:lumMod val="75000"/>
-                                  <a:lumOff val="25000"/>
-                                </a:schemeClr>
-                              </a:solidFill>
-                              <a:latin typeface="Cambria Math" panose="02040503050406030204" pitchFamily="18" charset="0"/>
-                            </a:rPr>
-                            <m:t>𝑟𝑒</m:t>
+                            <m:t>𝑝𝑟𝑒</m:t>
                           </m:r>
                         </m:sub>
                         <m:sup>
@@ -13404,7 +13415,7 @@
             </p:txBody>
           </p:sp>
         </mc:Choice>
-        <mc:Fallback>
+        <mc:Fallback xmlns="">
           <p:sp>
             <p:nvSpPr>
               <p:cNvPr id="3" name="Content Placeholder 2">
@@ -13518,8 +13529,8 @@
           </a:p>
         </p:txBody>
       </p:sp>
-      <mc:AlternateContent xmlns:mc="http://schemas.openxmlformats.org/markup-compatibility/2006">
-        <mc:Choice xmlns:a14="http://schemas.microsoft.com/office/drawing/2010/main" Requires="a14">
+      <mc:AlternateContent xmlns:mc="http://schemas.openxmlformats.org/markup-compatibility/2006" xmlns:a14="http://schemas.microsoft.com/office/drawing/2010/main">
+        <mc:Choice Requires="a14">
           <p:sp>
             <p:nvSpPr>
               <p:cNvPr id="3" name="Content Placeholder 2">
@@ -14426,7 +14437,7 @@
             </p:txBody>
           </p:sp>
         </mc:Choice>
-        <mc:Fallback>
+        <mc:Fallback xmlns="">
           <p:sp>
             <p:nvSpPr>
               <p:cNvPr id="3" name="Content Placeholder 2">
@@ -15116,8 +15127,8 @@
           </a:prstGeom>
         </p:spPr>
       </p:pic>
-      <mc:AlternateContent xmlns:mc="http://schemas.openxmlformats.org/markup-compatibility/2006">
-        <mc:Choice xmlns:a14="http://schemas.microsoft.com/office/drawing/2010/main" Requires="a14">
+      <mc:AlternateContent xmlns:mc="http://schemas.openxmlformats.org/markup-compatibility/2006" xmlns:a14="http://schemas.microsoft.com/office/drawing/2010/main">
+        <mc:Choice Requires="a14">
           <p:sp>
             <p:nvSpPr>
               <p:cNvPr id="3" name="TextBox 2">
@@ -15236,7 +15247,7 @@
             </p:txBody>
           </p:sp>
         </mc:Choice>
-        <mc:Fallback>
+        <mc:Fallback xmlns="">
           <p:sp>
             <p:nvSpPr>
               <p:cNvPr id="3" name="TextBox 2">
@@ -15281,8 +15292,8 @@
           </p:sp>
         </mc:Fallback>
       </mc:AlternateContent>
-      <mc:AlternateContent xmlns:mc="http://schemas.openxmlformats.org/markup-compatibility/2006">
-        <mc:Choice xmlns:a14="http://schemas.microsoft.com/office/drawing/2010/main" Requires="a14">
+      <mc:AlternateContent xmlns:mc="http://schemas.openxmlformats.org/markup-compatibility/2006" xmlns:a14="http://schemas.microsoft.com/office/drawing/2010/main">
+        <mc:Choice Requires="a14">
           <p:sp>
             <p:nvSpPr>
               <p:cNvPr id="4" name="TextBox 3">
@@ -15401,7 +15412,7 @@
             </p:txBody>
           </p:sp>
         </mc:Choice>
-        <mc:Fallback>
+        <mc:Fallback xmlns="">
           <p:sp>
             <p:nvSpPr>
               <p:cNvPr id="4" name="TextBox 3">
@@ -15446,8 +15457,8 @@
           </p:sp>
         </mc:Fallback>
       </mc:AlternateContent>
-      <mc:AlternateContent xmlns:mc="http://schemas.openxmlformats.org/markup-compatibility/2006">
-        <mc:Choice xmlns:a14="http://schemas.microsoft.com/office/drawing/2010/main" Requires="a14">
+      <mc:AlternateContent xmlns:mc="http://schemas.openxmlformats.org/markup-compatibility/2006" xmlns:a14="http://schemas.microsoft.com/office/drawing/2010/main">
+        <mc:Choice Requires="a14">
           <p:sp>
             <p:nvSpPr>
               <p:cNvPr id="5" name="TextBox 4">
@@ -15566,7 +15577,7 @@
             </p:txBody>
           </p:sp>
         </mc:Choice>
-        <mc:Fallback>
+        <mc:Fallback xmlns="">
           <p:sp>
             <p:nvSpPr>
               <p:cNvPr id="5" name="TextBox 4">
@@ -15611,8 +15622,8 @@
           </p:sp>
         </mc:Fallback>
       </mc:AlternateContent>
-      <mc:AlternateContent xmlns:mc="http://schemas.openxmlformats.org/markup-compatibility/2006">
-        <mc:Choice xmlns:a14="http://schemas.microsoft.com/office/drawing/2010/main" Requires="a14">
+      <mc:AlternateContent xmlns:mc="http://schemas.openxmlformats.org/markup-compatibility/2006" xmlns:a14="http://schemas.microsoft.com/office/drawing/2010/main">
+        <mc:Choice Requires="a14">
           <p:sp>
             <p:nvSpPr>
               <p:cNvPr id="6" name="TextBox 5">
@@ -15731,7 +15742,7 @@
             </p:txBody>
           </p:sp>
         </mc:Choice>
-        <mc:Fallback>
+        <mc:Fallback xmlns="">
           <p:sp>
             <p:nvSpPr>
               <p:cNvPr id="6" name="TextBox 5">
@@ -15882,8 +15893,8 @@
           </a:prstGeom>
         </p:spPr>
       </p:pic>
-      <mc:AlternateContent xmlns:mc="http://schemas.openxmlformats.org/markup-compatibility/2006">
-        <mc:Choice xmlns:a14="http://schemas.microsoft.com/office/drawing/2010/main" Requires="a14">
+      <mc:AlternateContent xmlns:mc="http://schemas.openxmlformats.org/markup-compatibility/2006" xmlns:a14="http://schemas.microsoft.com/office/drawing/2010/main">
+        <mc:Choice Requires="a14">
           <p:sp>
             <p:nvSpPr>
               <p:cNvPr id="6" name="TextBox 5">
@@ -16002,7 +16013,7 @@
             </p:txBody>
           </p:sp>
         </mc:Choice>
-        <mc:Fallback>
+        <mc:Fallback xmlns="">
           <p:sp>
             <p:nvSpPr>
               <p:cNvPr id="6" name="TextBox 5">
@@ -16047,8 +16058,8 @@
           </p:sp>
         </mc:Fallback>
       </mc:AlternateContent>
-      <mc:AlternateContent xmlns:mc="http://schemas.openxmlformats.org/markup-compatibility/2006">
-        <mc:Choice xmlns:a14="http://schemas.microsoft.com/office/drawing/2010/main" Requires="a14">
+      <mc:AlternateContent xmlns:mc="http://schemas.openxmlformats.org/markup-compatibility/2006" xmlns:a14="http://schemas.microsoft.com/office/drawing/2010/main">
+        <mc:Choice Requires="a14">
           <p:sp>
             <p:nvSpPr>
               <p:cNvPr id="7" name="TextBox 6">
@@ -16167,7 +16178,7 @@
             </p:txBody>
           </p:sp>
         </mc:Choice>
-        <mc:Fallback>
+        <mc:Fallback xmlns="">
           <p:sp>
             <p:nvSpPr>
               <p:cNvPr id="7" name="TextBox 6">
@@ -16212,8 +16223,8 @@
           </p:sp>
         </mc:Fallback>
       </mc:AlternateContent>
-      <mc:AlternateContent xmlns:mc="http://schemas.openxmlformats.org/markup-compatibility/2006">
-        <mc:Choice xmlns:a14="http://schemas.microsoft.com/office/drawing/2010/main" Requires="a14">
+      <mc:AlternateContent xmlns:mc="http://schemas.openxmlformats.org/markup-compatibility/2006" xmlns:a14="http://schemas.microsoft.com/office/drawing/2010/main">
+        <mc:Choice Requires="a14">
           <p:sp>
             <p:nvSpPr>
               <p:cNvPr id="9" name="TextBox 8">
@@ -16332,7 +16343,7 @@
             </p:txBody>
           </p:sp>
         </mc:Choice>
-        <mc:Fallback>
+        <mc:Fallback xmlns="">
           <p:sp>
             <p:nvSpPr>
               <p:cNvPr id="9" name="TextBox 8">
@@ -16377,8 +16388,8 @@
           </p:sp>
         </mc:Fallback>
       </mc:AlternateContent>
-      <mc:AlternateContent xmlns:mc="http://schemas.openxmlformats.org/markup-compatibility/2006">
-        <mc:Choice xmlns:a14="http://schemas.microsoft.com/office/drawing/2010/main" Requires="a14">
+      <mc:AlternateContent xmlns:mc="http://schemas.openxmlformats.org/markup-compatibility/2006" xmlns:a14="http://schemas.microsoft.com/office/drawing/2010/main">
+        <mc:Choice Requires="a14">
           <p:sp>
             <p:nvSpPr>
               <p:cNvPr id="10" name="TextBox 9">
@@ -16497,7 +16508,7 @@
             </p:txBody>
           </p:sp>
         </mc:Choice>
-        <mc:Fallback>
+        <mc:Fallback xmlns="">
           <p:sp>
             <p:nvSpPr>
               <p:cNvPr id="10" name="TextBox 9">
@@ -16542,8 +16553,8 @@
           </p:sp>
         </mc:Fallback>
       </mc:AlternateContent>
-      <mc:AlternateContent xmlns:mc="http://schemas.openxmlformats.org/markup-compatibility/2006">
-        <mc:Choice xmlns:a14="http://schemas.microsoft.com/office/drawing/2010/main" Requires="a14">
+      <mc:AlternateContent xmlns:mc="http://schemas.openxmlformats.org/markup-compatibility/2006" xmlns:a14="http://schemas.microsoft.com/office/drawing/2010/main">
+        <mc:Choice Requires="a14">
           <p:sp>
             <p:nvSpPr>
               <p:cNvPr id="11" name="TextBox 10">
@@ -16662,7 +16673,7 @@
             </p:txBody>
           </p:sp>
         </mc:Choice>
-        <mc:Fallback>
+        <mc:Fallback xmlns="">
           <p:sp>
             <p:nvSpPr>
               <p:cNvPr id="11" name="TextBox 10">
@@ -16737,8 +16748,8 @@
           <a:chExt cx="0" cy="0"/>
         </a:xfrm>
       </p:grpSpPr>
-      <mc:AlternateContent xmlns:mc="http://schemas.openxmlformats.org/markup-compatibility/2006">
-        <mc:Choice xmlns:a14="http://schemas.microsoft.com/office/drawing/2010/main" Requires="a14">
+      <mc:AlternateContent xmlns:mc="http://schemas.openxmlformats.org/markup-compatibility/2006" xmlns:a14="http://schemas.microsoft.com/office/drawing/2010/main">
+        <mc:Choice Requires="a14">
           <p:sp>
             <p:nvSpPr>
               <p:cNvPr id="3" name="Content Placeholder 2">
@@ -16873,7 +16884,7 @@
             </p:txBody>
           </p:sp>
         </mc:Choice>
-        <mc:Fallback>
+        <mc:Fallback xmlns="">
           <p:sp>
             <p:nvSpPr>
               <p:cNvPr id="3" name="Content Placeholder 2">
@@ -17311,8 +17322,8 @@
           </a:p>
         </p:txBody>
       </p:sp>
-      <mc:AlternateContent xmlns:mc="http://schemas.openxmlformats.org/markup-compatibility/2006">
-        <mc:Choice xmlns:a14="http://schemas.microsoft.com/office/drawing/2010/main" Requires="a14">
+      <mc:AlternateContent xmlns:mc="http://schemas.openxmlformats.org/markup-compatibility/2006" xmlns:a14="http://schemas.microsoft.com/office/drawing/2010/main">
+        <mc:Choice Requires="a14">
           <p:sp>
             <p:nvSpPr>
               <p:cNvPr id="3" name="Content Placeholder 2">
@@ -17834,7 +17845,7 @@
             </p:txBody>
           </p:sp>
         </mc:Choice>
-        <mc:Fallback>
+        <mc:Fallback xmlns="">
           <p:sp>
             <p:nvSpPr>
               <p:cNvPr id="3" name="Content Placeholder 2">

</xml_diff>